<commit_message>
Cambio a la presentación (se agregó el link del repo de github.)
</commit_message>
<xml_diff>
--- a/explicando_ml/Explicando modelos de Aprendizaje Automático.pptx
+++ b/explicando_ml/Explicando modelos de Aprendizaje Automático.pptx
@@ -5,7 +5,7 @@
     <p:sldMasterId id="2147483672" r:id="rId1"/>
   </p:sldMasterIdLst>
   <p:notesMasterIdLst>
-    <p:notesMasterId r:id="rId29"/>
+    <p:notesMasterId r:id="rId30"/>
   </p:notesMasterIdLst>
   <p:sldIdLst>
     <p:sldId id="256" r:id="rId2"/>
@@ -34,7 +34,8 @@
     <p:sldId id="284" r:id="rId25"/>
     <p:sldId id="285" r:id="rId26"/>
     <p:sldId id="286" r:id="rId27"/>
-    <p:sldId id="265" r:id="rId28"/>
+    <p:sldId id="287" r:id="rId28"/>
+    <p:sldId id="265" r:id="rId29"/>
   </p:sldIdLst>
   <p:sldSz cx="12192000" cy="6858000"/>
   <p:notesSz cx="6858000" cy="9144000"/>
@@ -223,7 +224,7 @@
           <a:p>
             <a:fld id="{D4BA1558-7D69-4968-A82D-E225FB0F61C4}" type="datetimeFigureOut">
               <a:rPr lang="en-US" smtClean="0"/>
-              <a:t>2/24/2021</a:t>
+              <a:t>2/26/2021</a:t>
             </a:fld>
             <a:endParaRPr lang="en-US"/>
           </a:p>
@@ -16526,6 +16527,131 @@
       </p:grpSpPr>
       <p:sp>
         <p:nvSpPr>
+          <p:cNvPr id="2" name="Título 1">
+            <a:extLst>
+              <a:ext uri="{FF2B5EF4-FFF2-40B4-BE49-F238E27FC236}">
+                <a16:creationId xmlns:a16="http://schemas.microsoft.com/office/drawing/2014/main" id="{B09F9AE3-8ABB-455F-B7EE-FC81C2E6F66E}"/>
+              </a:ext>
+            </a:extLst>
+          </p:cNvPr>
+          <p:cNvSpPr>
+            <a:spLocks noGrp="1"/>
+          </p:cNvSpPr>
+          <p:nvPr>
+            <p:ph type="title"/>
+          </p:nvPr>
+        </p:nvSpPr>
+        <p:spPr/>
+        <p:txBody>
+          <a:bodyPr/>
+          <a:lstStyle/>
+          <a:p>
+            <a:r>
+              <a:rPr lang="es-MX" dirty="0"/>
+              <a:t>Vamos a programar…</a:t>
+            </a:r>
+            <a:endParaRPr lang="en-US" dirty="0"/>
+          </a:p>
+        </p:txBody>
+      </p:sp>
+      <p:sp>
+        <p:nvSpPr>
+          <p:cNvPr id="3" name="Marcador de contenido 2">
+            <a:extLst>
+              <a:ext uri="{FF2B5EF4-FFF2-40B4-BE49-F238E27FC236}">
+                <a16:creationId xmlns:a16="http://schemas.microsoft.com/office/drawing/2014/main" id="{37B8CC7F-839F-4C1B-9466-04A0D21C6B64}"/>
+              </a:ext>
+            </a:extLst>
+          </p:cNvPr>
+          <p:cNvSpPr>
+            <a:spLocks noGrp="1"/>
+          </p:cNvSpPr>
+          <p:nvPr>
+            <p:ph idx="1"/>
+          </p:nvPr>
+        </p:nvSpPr>
+        <p:spPr>
+          <a:xfrm>
+            <a:off x="913794" y="3086464"/>
+            <a:ext cx="10353762" cy="887659"/>
+          </a:xfrm>
+        </p:spPr>
+        <p:txBody>
+          <a:bodyPr>
+            <a:normAutofit/>
+          </a:bodyPr>
+          <a:lstStyle/>
+          <a:p>
+            <a:pPr algn="ctr"/>
+            <a:r>
+              <a:rPr lang="en-US" sz="2800" b="1" dirty="0"/>
+              <a:t>https://github.com/dhdzmota/explaining_ml_ironhack</a:t>
+            </a:r>
+          </a:p>
+        </p:txBody>
+      </p:sp>
+      <p:sp>
+        <p:nvSpPr>
+          <p:cNvPr id="4" name="Marcador de número de diapositiva 3">
+            <a:extLst>
+              <a:ext uri="{FF2B5EF4-FFF2-40B4-BE49-F238E27FC236}">
+                <a16:creationId xmlns:a16="http://schemas.microsoft.com/office/drawing/2014/main" id="{34E811C5-07DC-4815-A234-1566E6C83A61}"/>
+              </a:ext>
+            </a:extLst>
+          </p:cNvPr>
+          <p:cNvSpPr>
+            <a:spLocks noGrp="1"/>
+          </p:cNvSpPr>
+          <p:nvPr>
+            <p:ph type="sldNum" sz="quarter" idx="12"/>
+          </p:nvPr>
+        </p:nvSpPr>
+        <p:spPr/>
+        <p:txBody>
+          <a:bodyPr/>
+          <a:lstStyle/>
+          <a:p>
+            <a:fld id="{DFA5D71E-5CDF-4C93-8A75-5B916FDC5BEA}" type="slidenum">
+              <a:rPr lang="en-US" smtClean="0"/>
+              <a:pPr/>
+              <a:t>27</a:t>
+            </a:fld>
+            <a:endParaRPr lang="en-US" dirty="0"/>
+          </a:p>
+        </p:txBody>
+      </p:sp>
+    </p:spTree>
+    <p:extLst>
+      <p:ext uri="{BB962C8B-B14F-4D97-AF65-F5344CB8AC3E}">
+        <p14:creationId xmlns:p14="http://schemas.microsoft.com/office/powerpoint/2010/main" val="3071911659"/>
+      </p:ext>
+    </p:extLst>
+  </p:cSld>
+  <p:clrMapOvr>
+    <a:masterClrMapping/>
+  </p:clrMapOvr>
+</p:sld>
+</file>
+
+<file path=ppt/slides/slide28.xml><?xml version="1.0" encoding="utf-8"?>
+<p:sld xmlns:a="http://schemas.openxmlformats.org/drawingml/2006/main" xmlns:r="http://schemas.openxmlformats.org/officeDocument/2006/relationships" xmlns:p="http://schemas.openxmlformats.org/presentationml/2006/main">
+  <p:cSld>
+    <p:spTree>
+      <p:nvGrpSpPr>
+        <p:cNvPr id="1" name=""/>
+        <p:cNvGrpSpPr/>
+        <p:nvPr/>
+      </p:nvGrpSpPr>
+      <p:grpSpPr>
+        <a:xfrm>
+          <a:off x="0" y="0"/>
+          <a:ext cx="0" cy="0"/>
+          <a:chOff x="0" y="0"/>
+          <a:chExt cx="0" cy="0"/>
+        </a:xfrm>
+      </p:grpSpPr>
+      <p:sp>
+        <p:nvSpPr>
           <p:cNvPr id="2" name="Marcador de número de diapositiva 1">
             <a:extLst>
               <a:ext uri="{FF2B5EF4-FFF2-40B4-BE49-F238E27FC236}">
@@ -16548,7 +16674,7 @@
             <a:fld id="{DFA5D71E-5CDF-4C93-8A75-5B916FDC5BEA}" type="slidenum">
               <a:rPr lang="en-US" smtClean="0"/>
               <a:pPr/>
-              <a:t>27</a:t>
+              <a:t>28</a:t>
             </a:fld>
             <a:endParaRPr lang="en-US" dirty="0"/>
           </a:p>

</xml_diff>

<commit_message>
Minor changes in presentation (updated).
</commit_message>
<xml_diff>
--- a/explicando_ml/Explicando modelos de Aprendizaje Automático.pptx
+++ b/explicando_ml/Explicando modelos de Aprendizaje Automático.pptx
@@ -224,7 +224,7 @@
           <a:p>
             <a:fld id="{D4BA1558-7D69-4968-A82D-E225FB0F61C4}" type="datetimeFigureOut">
               <a:rPr lang="en-US" smtClean="0"/>
-              <a:t>2/26/2021</a:t>
+              <a:t>8/11/2021</a:t>
             </a:fld>
             <a:endParaRPr lang="en-US"/>
           </a:p>
@@ -677,7 +677,7 @@
           <a:p>
             <a:fld id="{3F7015FB-0A9B-4C4C-BCAB-724561E021AB}" type="datetime6">
               <a:rPr lang="es-MX" smtClean="0"/>
-              <a:t>febrero de 2021</a:t>
+              <a:t>agosto de 2021</a:t>
             </a:fld>
             <a:endParaRPr lang="en-US" dirty="0"/>
           </a:p>
@@ -980,7 +980,7 @@
           <a:p>
             <a:fld id="{6585AF75-3A79-4603-9560-B4E17A32B122}" type="datetime6">
               <a:rPr lang="es-MX" smtClean="0"/>
-              <a:t>febrero de 2021</a:t>
+              <a:t>agosto de 2021</a:t>
             </a:fld>
             <a:endParaRPr lang="en-US" dirty="0"/>
           </a:p>
@@ -1177,7 +1177,7 @@
           <a:p>
             <a:fld id="{4607BEA2-DC1A-4B7D-BB35-08D398D04F01}" type="datetime6">
               <a:rPr lang="es-MX" smtClean="0"/>
-              <a:t>febrero de 2021</a:t>
+              <a:t>agosto de 2021</a:t>
             </a:fld>
             <a:endParaRPr lang="en-US" dirty="0"/>
           </a:p>
@@ -1443,7 +1443,7 @@
           <a:p>
             <a:fld id="{9F6FF543-B15F-4A83-9312-3440F4C66CB6}" type="datetime6">
               <a:rPr lang="es-MX" smtClean="0"/>
-              <a:t>febrero de 2021</a:t>
+              <a:t>agosto de 2021</a:t>
             </a:fld>
             <a:endParaRPr lang="en-US" dirty="0"/>
           </a:p>
@@ -1872,7 +1872,7 @@
           <a:p>
             <a:fld id="{09B6ABAE-0D96-49E8-8FF9-DAA74276EA82}" type="datetime6">
               <a:rPr lang="es-MX" smtClean="0"/>
-              <a:t>febrero de 2021</a:t>
+              <a:t>agosto de 2021</a:t>
             </a:fld>
             <a:endParaRPr lang="en-US" dirty="0"/>
           </a:p>
@@ -2414,7 +2414,7 @@
           <a:p>
             <a:fld id="{B11843EE-500C-4766-AB31-9D2022415B68}" type="datetime6">
               <a:rPr lang="es-MX" smtClean="0"/>
-              <a:t>febrero de 2021</a:t>
+              <a:t>agosto de 2021</a:t>
             </a:fld>
             <a:endParaRPr lang="en-US" dirty="0"/>
           </a:p>
@@ -3283,7 +3283,7 @@
           <a:p>
             <a:fld id="{6FE0D54B-A9B0-4079-AA1F-072A362536BB}" type="datetime6">
               <a:rPr lang="es-MX" smtClean="0"/>
-              <a:t>febrero de 2021</a:t>
+              <a:t>agosto de 2021</a:t>
             </a:fld>
             <a:endParaRPr lang="en-US" dirty="0"/>
           </a:p>
@@ -3458,7 +3458,7 @@
           <a:p>
             <a:fld id="{617306A8-713F-4510-9DEB-47DA9FE42FAD}" type="datetime6">
               <a:rPr lang="es-MX" smtClean="0"/>
-              <a:t>febrero de 2021</a:t>
+              <a:t>agosto de 2021</a:t>
             </a:fld>
             <a:endParaRPr lang="en-US" dirty="0"/>
           </a:p>
@@ -3647,7 +3647,7 @@
           <a:p>
             <a:fld id="{D1FBB98D-6366-4D3E-AF03-552AB77A125F}" type="datetime6">
               <a:rPr lang="es-MX" smtClean="0"/>
-              <a:t>febrero de 2021</a:t>
+              <a:t>agosto de 2021</a:t>
             </a:fld>
             <a:endParaRPr lang="en-US" dirty="0"/>
           </a:p>
@@ -3822,7 +3822,7 @@
           <a:p>
             <a:fld id="{FC7AAACB-1E72-4460-AF82-870D83BF4AA0}" type="datetime6">
               <a:rPr lang="es-MX" smtClean="0"/>
-              <a:t>febrero de 2021</a:t>
+              <a:t>agosto de 2021</a:t>
             </a:fld>
             <a:endParaRPr lang="en-US" dirty="0"/>
           </a:p>
@@ -4071,7 +4071,7 @@
           <a:p>
             <a:fld id="{D9086DCA-6D53-45C0-89A7-6D72381BDC08}" type="datetime6">
               <a:rPr lang="es-MX" smtClean="0"/>
-              <a:t>febrero de 2021</a:t>
+              <a:t>agosto de 2021</a:t>
             </a:fld>
             <a:endParaRPr lang="en-US" dirty="0"/>
           </a:p>
@@ -4312,7 +4312,7 @@
           <a:p>
             <a:fld id="{3367D2D8-4C89-4E29-B513-9F459ECE3A1D}" type="datetime6">
               <a:rPr lang="es-MX" smtClean="0"/>
-              <a:t>febrero de 2021</a:t>
+              <a:t>agosto de 2021</a:t>
             </a:fld>
             <a:endParaRPr lang="en-US" dirty="0"/>
           </a:p>
@@ -4783,7 +4783,7 @@
           <a:p>
             <a:fld id="{F4B20450-D32A-45F1-A9DE-67AE5712D8D7}" type="datetime6">
               <a:rPr lang="es-MX" smtClean="0"/>
-              <a:t>febrero de 2021</a:t>
+              <a:t>agosto de 2021</a:t>
             </a:fld>
             <a:endParaRPr lang="en-US" dirty="0"/>
           </a:p>
@@ -4906,7 +4906,7 @@
           <a:p>
             <a:fld id="{5D5D6E05-FA9D-40CF-9DBC-1194027FAE14}" type="datetime6">
               <a:rPr lang="es-MX" smtClean="0"/>
-              <a:t>febrero de 2021</a:t>
+              <a:t>agosto de 2021</a:t>
             </a:fld>
             <a:endParaRPr lang="en-US" dirty="0"/>
           </a:p>
@@ -5006,7 +5006,7 @@
           <a:p>
             <a:fld id="{FA59D718-192F-47D3-B83E-3561CA3A6A1F}" type="datetime6">
               <a:rPr lang="es-MX" smtClean="0"/>
-              <a:t>febrero de 2021</a:t>
+              <a:t>agosto de 2021</a:t>
             </a:fld>
             <a:endParaRPr lang="en-US" dirty="0"/>
           </a:p>
@@ -5266,7 +5266,7 @@
           <a:p>
             <a:fld id="{83115EFD-5031-4A97-A25B-E12FE5F6A299}" type="datetime6">
               <a:rPr lang="es-MX" smtClean="0"/>
-              <a:t>febrero de 2021</a:t>
+              <a:t>agosto de 2021</a:t>
             </a:fld>
             <a:endParaRPr lang="en-US" dirty="0"/>
           </a:p>
@@ -5571,7 +5571,7 @@
           <a:p>
             <a:fld id="{933B8413-C9DD-498D-A296-DFD3B78AAA9C}" type="datetime6">
               <a:rPr lang="es-MX" smtClean="0"/>
-              <a:t>febrero de 2021</a:t>
+              <a:t>agosto de 2021</a:t>
             </a:fld>
             <a:endParaRPr lang="en-US" dirty="0"/>
           </a:p>
@@ -5810,7 +5810,7 @@
           <a:p>
             <a:fld id="{C687FA58-CD7F-4320-A946-F3927A5D1129}" type="datetime6">
               <a:rPr lang="es-MX" smtClean="0"/>
-              <a:t>febrero de 2021</a:t>
+              <a:t>agosto de 2021</a:t>
             </a:fld>
             <a:endParaRPr lang="en-US" dirty="0"/>
           </a:p>
@@ -6594,7 +6594,7 @@
                   <a:srgbClr val="FFFFFF"/>
                 </a:solidFill>
               </a:rPr>
-              <a:t>Febrero, 2021</a:t>
+              <a:t>Agosto, 2021</a:t>
             </a:r>
             <a:endParaRPr lang="es-MX" sz="1400" dirty="0">
               <a:solidFill>
@@ -10919,7 +10919,7 @@
             </a:pPr>
             <a:r>
               <a:rPr lang="es-MX" dirty="0"/>
-              <a:t>Ponderar las nuevas instancias de acuerdo a la proximidad que tienen con la instancia de interés.</a:t>
+              <a:t>Perturbar esa instancia y hacer que el modelo haga predicciones para esas nuevas instancias.</a:t>
             </a:r>
           </a:p>
           <a:p>
@@ -10929,7 +10929,7 @@
             </a:pPr>
             <a:r>
               <a:rPr lang="es-MX" dirty="0"/>
-              <a:t>Perturbar esa instancia y hacer que el modelo haga predicciones para esas nuevas instancias.</a:t>
+              <a:t>Ponderar las nuevas instancias de acuerdo a la proximidad que tienen con la instancia de interés.</a:t>
             </a:r>
           </a:p>
           <a:p>
@@ -13468,7 +13468,7 @@
             </a:br>
             <a:r>
               <a:rPr lang="es-MX" sz="2000" dirty="0"/>
-              <a:t>(Guadalajara 2 y 3, LATAM)</a:t>
+              <a:t>(Guadalajara 2 y 3, LATAM 1 y 2)</a:t>
             </a:r>
           </a:p>
           <a:p>

</xml_diff>

<commit_message>
Changes in power point format
</commit_message>
<xml_diff>
--- a/explicando_ml/Explicando modelos de Aprendizaje Automático.pptx
+++ b/explicando_ml/Explicando modelos de Aprendizaje Automático.pptx
@@ -224,7 +224,7 @@
           <a:p>
             <a:fld id="{D4BA1558-7D69-4968-A82D-E225FB0F61C4}" type="datetimeFigureOut">
               <a:rPr lang="en-US" smtClean="0"/>
-              <a:t>8/11/2021</a:t>
+              <a:t>8/12/2021</a:t>
             </a:fld>
             <a:endParaRPr lang="en-US"/>
           </a:p>
@@ -7071,7 +7071,7 @@
                   </a:solidFill>
                 </a:ln>
                 <a:solidFill>
-                  <a:srgbClr val="DADADA"/>
+                  <a:srgbClr val="BC451B"/>
                 </a:solidFill>
                 <a:effectLst>
                   <a:outerShdw blurRad="9525" dist="25400" dir="14640000" algn="tl" rotWithShape="0">
@@ -7081,7 +7081,29 @@
                   </a:outerShdw>
                 </a:effectLst>
               </a:rPr>
-              <a:t>LIME (Explicación local de modelos agnósticos interpretables)</a:t>
+              <a:t>LIME</a:t>
+            </a:r>
+            <a:r>
+              <a:rPr lang="es-MX" sz="2800" b="1" dirty="0">
+                <a:ln>
+                  <a:solidFill>
+                    <a:srgbClr val="404040">
+                      <a:alpha val="10000"/>
+                    </a:srgbClr>
+                  </a:solidFill>
+                </a:ln>
+                <a:solidFill>
+                  <a:srgbClr val="DADADA"/>
+                </a:solidFill>
+                <a:effectLst>
+                  <a:outerShdw blurRad="9525" dist="25400" dir="14640000" algn="tl" rotWithShape="0">
+                    <a:schemeClr val="bg1">
+                      <a:alpha val="30000"/>
+                    </a:schemeClr>
+                  </a:outerShdw>
+                </a:effectLst>
+              </a:rPr>
+              <a:t> (Explicación local de modelos agnósticos interpretables)</a:t>
             </a:r>
           </a:p>
           <a:p>
@@ -7124,7 +7146,7 @@
                   </a:solidFill>
                 </a:ln>
                 <a:solidFill>
-                  <a:srgbClr val="DADADA"/>
+                  <a:srgbClr val="BC451B"/>
                 </a:solidFill>
                 <a:effectLst>
                   <a:outerShdw blurRad="9525" dist="25400" dir="14640000" algn="tl" rotWithShape="0">
@@ -7134,7 +7156,29 @@
                   </a:outerShdw>
                 </a:effectLst>
               </a:rPr>
-              <a:t>ANCHORS (Explicaciones de alta precisión de modelos agnósticos)</a:t>
+              <a:t>ANCHORS</a:t>
+            </a:r>
+            <a:r>
+              <a:rPr lang="es-MX" sz="2800" b="1" dirty="0">
+                <a:ln>
+                  <a:solidFill>
+                    <a:srgbClr val="404040">
+                      <a:alpha val="10000"/>
+                    </a:srgbClr>
+                  </a:solidFill>
+                </a:ln>
+                <a:solidFill>
+                  <a:srgbClr val="DADADA"/>
+                </a:solidFill>
+                <a:effectLst>
+                  <a:outerShdw blurRad="9525" dist="25400" dir="14640000" algn="tl" rotWithShape="0">
+                    <a:schemeClr val="bg1">
+                      <a:alpha val="30000"/>
+                    </a:schemeClr>
+                  </a:outerShdw>
+                </a:effectLst>
+              </a:rPr>
+              <a:t> (Explicaciones de alta precisión de modelos agnósticos)</a:t>
             </a:r>
           </a:p>
           <a:p>
@@ -7177,7 +7221,7 @@
                   </a:solidFill>
                 </a:ln>
                 <a:solidFill>
-                  <a:srgbClr val="DADADA"/>
+                  <a:srgbClr val="BC451B"/>
                 </a:solidFill>
                 <a:effectLst>
                   <a:outerShdw blurRad="9525" dist="25400" dir="14640000" algn="tl" rotWithShape="0">
@@ -7187,7 +7231,29 @@
                   </a:outerShdw>
                 </a:effectLst>
               </a:rPr>
-              <a:t>SHAP (Explicaciones aditivas de Shapley)</a:t>
+              <a:t>SHAP</a:t>
+            </a:r>
+            <a:r>
+              <a:rPr lang="es-MX" sz="2800" b="1" dirty="0">
+                <a:ln>
+                  <a:solidFill>
+                    <a:srgbClr val="404040">
+                      <a:alpha val="10000"/>
+                    </a:srgbClr>
+                  </a:solidFill>
+                </a:ln>
+                <a:solidFill>
+                  <a:srgbClr val="DADADA"/>
+                </a:solidFill>
+                <a:effectLst>
+                  <a:outerShdw blurRad="9525" dist="25400" dir="14640000" algn="tl" rotWithShape="0">
+                    <a:schemeClr val="bg1">
+                      <a:alpha val="30000"/>
+                    </a:schemeClr>
+                  </a:outerShdw>
+                </a:effectLst>
+              </a:rPr>
+              <a:t> (Explicaciones aditivas de Shapley)</a:t>
             </a:r>
           </a:p>
           <a:p>
@@ -11682,10 +11748,22 @@
           <a:p>
             <a:pPr algn="l"/>
             <a:r>
-              <a:rPr lang="es-MX" b="1" dirty="0"/>
+              <a:rPr lang="es-MX" b="1" dirty="0">
+                <a:solidFill>
+                  <a:schemeClr val="tx1">
+                    <a:lumMod val="85000"/>
+                  </a:schemeClr>
+                </a:solidFill>
+              </a:rPr>
               <a:t>Anchor</a:t>
             </a:r>
-            <a:endParaRPr lang="en-US" b="1" dirty="0"/>
+            <a:endParaRPr lang="en-US" b="1" dirty="0">
+              <a:solidFill>
+                <a:schemeClr val="tx1">
+                  <a:lumMod val="85000"/>
+                </a:schemeClr>
+              </a:solidFill>
+            </a:endParaRPr>
           </a:p>
         </p:txBody>
       </p:sp>
@@ -13392,10 +13470,18 @@
           <a:lstStyle/>
           <a:p>
             <a:r>
-              <a:rPr lang="es-MX" sz="2800" b="1" dirty="0"/>
+              <a:rPr lang="es-MX" sz="2800" b="1" dirty="0">
+                <a:solidFill>
+                  <a:srgbClr val="BC451B"/>
+                </a:solidFill>
+              </a:rPr>
               <a:t>Daniel Hernández Mota:</a:t>
             </a:r>
-            <a:endParaRPr lang="en-US" sz="2800" b="1" dirty="0"/>
+            <a:endParaRPr lang="en-US" sz="2800" b="1" dirty="0">
+              <a:solidFill>
+                <a:srgbClr val="BC451B"/>
+              </a:solidFill>
+            </a:endParaRPr>
           </a:p>
         </p:txBody>
       </p:sp>

</xml_diff>